<commit_message>
Review post Feb. Release
</commit_message>
<xml_diff>
--- a/Introducing SQL Operations Studio.pptx
+++ b/Introducing SQL Operations Studio.pptx
@@ -7316,11 +7316,7 @@
           <a:p>
             <a:r>
               <a:rPr lang="en-US" dirty="0" smtClean="0"/>
-              <a:t>Core </a:t>
-            </a:r>
-            <a:r>
-              <a:rPr lang="en-US" dirty="0" smtClean="0"/>
-              <a:t>functionalities</a:t>
+              <a:t>Core functionalities</a:t>
             </a:r>
             <a:endParaRPr lang="en-US" dirty="0"/>
           </a:p>
@@ -8216,11 +8212,7 @@
             </a:r>
             <a:r>
               <a:rPr lang="en-US" sz="2800" dirty="0" smtClean="0"/>
-              <a:t> </a:t>
-            </a:r>
-            <a:r>
-              <a:rPr lang="en-US" sz="2800" dirty="0" smtClean="0"/>
-              <a:t>di </a:t>
+              <a:t> di </a:t>
             </a:r>
             <a:r>
               <a:rPr lang="en-US" sz="2800" dirty="0" err="1" smtClean="0"/>
@@ -8318,11 +8310,7 @@
             </a:r>
             <a:r>
               <a:rPr lang="en-US" sz="2800" dirty="0" smtClean="0"/>
-              <a:t> </a:t>
-            </a:r>
-            <a:r>
-              <a:rPr lang="en-US" sz="2800" dirty="0" smtClean="0"/>
-              <a:t>settings “</a:t>
+              <a:t> settings “</a:t>
             </a:r>
             <a:r>
               <a:rPr lang="en-US" sz="2800" dirty="0" err="1" smtClean="0"/>
@@ -8467,13 +8455,8 @@
             </a:r>
             <a:r>
               <a:rPr lang="en-US" sz="2800" dirty="0" smtClean="0"/>
-              <a:t> Source Control Manager (SMC) by </a:t>
-            </a:r>
-            <a:r>
-              <a:rPr lang="en-US" sz="2800" dirty="0" smtClean="0"/>
-              <a:t>design</a:t>
-            </a:r>
-            <a:endParaRPr lang="en-US" sz="2800" dirty="0" smtClean="0"/>
+              <a:t> Source Control Manager (SMC) by design</a:t>
+            </a:r>
           </a:p>
           <a:p>
             <a:pPr marL="685800" indent="-685800">
@@ -8719,11 +8702,7 @@
             </a:pPr>
             <a:r>
               <a:rPr lang="en-US" sz="2800" dirty="0" smtClean="0"/>
-              <a:t>Server &amp; </a:t>
-            </a:r>
-            <a:r>
-              <a:rPr lang="en-US" sz="2800" dirty="0" smtClean="0"/>
-              <a:t>Database Dashboard</a:t>
+              <a:t>Server &amp; Database Dashboard</a:t>
             </a:r>
           </a:p>
           <a:p>
@@ -8755,7 +8734,6 @@
               <a:rPr lang="en-US" sz="2800" dirty="0" smtClean="0"/>
               <a:t> Settings</a:t>
             </a:r>
-            <a:endParaRPr lang="en-US" sz="2800" dirty="0" smtClean="0"/>
           </a:p>
           <a:p>
             <a:pPr marL="571500" indent="-571500">
@@ -8902,13 +8880,8 @@
             </a:r>
             <a:r>
               <a:rPr lang="en-US" sz="2000" dirty="0" smtClean="0"/>
-              <a:t> in </a:t>
-            </a:r>
-            <a:r>
-              <a:rPr lang="en-US" sz="2000" dirty="0" smtClean="0"/>
-              <a:t>Preview </a:t>
-            </a:r>
-            <a:endParaRPr lang="en-US" sz="2000" dirty="0" smtClean="0"/>
+              <a:t> in Preview </a:t>
+            </a:r>
           </a:p>
           <a:p>
             <a:pPr marL="1147527" lvl="1" indent="-571500">
@@ -8955,11 +8928,7 @@
           <a:p>
             <a:r>
               <a:rPr lang="en-US" dirty="0" smtClean="0"/>
-              <a:t>Dashboard &amp; </a:t>
-            </a:r>
-            <a:r>
-              <a:rPr lang="en-US" dirty="0" smtClean="0"/>
-              <a:t>Insights</a:t>
+              <a:t>Dashboard &amp; Insights</a:t>
             </a:r>
             <a:endParaRPr lang="en-US" dirty="0"/>
           </a:p>
@@ -9289,13 +9258,13 @@
   <p:clrMapOvr>
     <a:masterClrMapping/>
   </p:clrMapOvr>
-  <mc:AlternateContent xmlns:mc="http://schemas.openxmlformats.org/markup-compatibility/2006">
-    <mc:Choice xmlns:p14="http://schemas.microsoft.com/office/powerpoint/2010/main" Requires="p14">
+  <mc:AlternateContent xmlns:mc="http://schemas.openxmlformats.org/markup-compatibility/2006" xmlns:p14="http://schemas.microsoft.com/office/powerpoint/2010/main">
+    <mc:Choice Requires="p14">
       <p:transition spd="med" p14:dur="700">
         <p:fade/>
       </p:transition>
     </mc:Choice>
-    <mc:Fallback>
+    <mc:Fallback xmlns="">
       <p:transition spd="med">
         <p:fade/>
       </p:transition>
@@ -10134,6 +10103,30 @@
           <a:chExt cx="0" cy="0"/>
         </a:xfrm>
       </p:grpSpPr>
+      <p:pic>
+        <p:nvPicPr>
+          <p:cNvPr id="2" name="Picture 1"/>
+          <p:cNvPicPr>
+            <a:picLocks noChangeAspect="1"/>
+          </p:cNvPicPr>
+          <p:nvPr/>
+        </p:nvPicPr>
+        <p:blipFill>
+          <a:blip r:embed="rId2"/>
+          <a:stretch>
+            <a:fillRect/>
+          </a:stretch>
+        </p:blipFill>
+        <p:spPr>
+          <a:xfrm>
+            <a:off x="5801583" y="1439813"/>
+            <a:ext cx="5172236" cy="3763955"/>
+          </a:xfrm>
+          <a:prstGeom prst="rect">
+            <a:avLst/>
+          </a:prstGeom>
+        </p:spPr>
+      </p:pic>
       <p:sp>
         <p:nvSpPr>
           <p:cNvPr id="18" name="Title 17"/>
@@ -10249,30 +10242,6 @@
           </a:p>
         </p:txBody>
       </p:sp>
-      <p:pic>
-        <p:nvPicPr>
-          <p:cNvPr id="4" name="Picture 3"/>
-          <p:cNvPicPr>
-            <a:picLocks noChangeAspect="1"/>
-          </p:cNvPicPr>
-          <p:nvPr/>
-        </p:nvPicPr>
-        <p:blipFill>
-          <a:blip r:embed="rId2"/>
-          <a:stretch>
-            <a:fillRect/>
-          </a:stretch>
-        </p:blipFill>
-        <p:spPr>
-          <a:xfrm>
-            <a:off x="5670982" y="1439813"/>
-            <a:ext cx="5490056" cy="3932212"/>
-          </a:xfrm>
-          <a:prstGeom prst="rect">
-            <a:avLst/>
-          </a:prstGeom>
-        </p:spPr>
-      </p:pic>
       <p:sp>
         <p:nvSpPr>
           <p:cNvPr id="3" name="Right Arrow 2"/>
@@ -10281,7 +10250,7 @@
         </p:nvSpPr>
         <p:spPr>
           <a:xfrm>
-            <a:off x="3300152" y="4657131"/>
+            <a:off x="3300152" y="4590627"/>
             <a:ext cx="2219498" cy="613139"/>
           </a:xfrm>
           <a:prstGeom prst="rightArrow">
@@ -10330,8 +10299,8 @@
         </p:nvSpPr>
         <p:spPr>
           <a:xfrm>
-            <a:off x="5761038" y="4779818"/>
-            <a:ext cx="5253326" cy="423949"/>
+            <a:off x="5877098" y="4638497"/>
+            <a:ext cx="5004262" cy="423949"/>
           </a:xfrm>
           <a:prstGeom prst="rect">
             <a:avLst/>
@@ -10353,7 +10322,7 @@
           </a:fontRef>
         </p:style>
         <p:txBody>
-          <a:bodyPr lIns="0" tIns="0" rIns="0" bIns="0" rtlCol="0" anchor="ctr">
+          <a:bodyPr wrap="square" lIns="0" tIns="0" rIns="0" bIns="0" rtlCol="0" anchor="ctr">
             <a:spAutoFit/>
           </a:bodyPr>
           <a:lstStyle/>
@@ -11172,11 +11141,7 @@
             </a:r>
             <a:r>
               <a:rPr lang="en-US" dirty="0" smtClean="0"/>
-              <a:t> </a:t>
-            </a:r>
-            <a:r>
-              <a:rPr lang="en-US" dirty="0" smtClean="0"/>
-              <a:t>rese </a:t>
+              <a:t> rese </a:t>
             </a:r>
             <a:r>
               <a:rPr lang="en-US" dirty="0" err="1" smtClean="0"/>
@@ -11208,11 +11173,7 @@
             </a:r>
             <a:r>
               <a:rPr lang="en-US" dirty="0" smtClean="0"/>
-              <a:t> </a:t>
-            </a:r>
-            <a:r>
-              <a:rPr lang="en-US" dirty="0" smtClean="0"/>
-              <a:t>di Extensibility</a:t>
+              <a:t> di Extensibility</a:t>
             </a:r>
             <a:endParaRPr lang="en-US" dirty="0"/>
           </a:p>
@@ -12902,33 +12863,12 @@
             </a:endParaRPr>
           </a:p>
           <a:p>
-            <a:r>
-              <a:rPr lang="en-US" altLang="en-US" sz="1900" dirty="0" smtClean="0">
-                <a:solidFill>
-                  <a:srgbClr val="293338"/>
-                </a:solidFill>
-                <a:latin typeface="inherit"/>
-              </a:rPr>
-              <a:t>	ERRATA CORRIGE: </a:t>
-            </a:r>
-            <a:r>
-              <a:rPr lang="en-US" altLang="en-US" sz="1900" dirty="0" err="1" smtClean="0">
-                <a:solidFill>
-                  <a:srgbClr val="293338"/>
-                </a:solidFill>
-                <a:latin typeface="inherit"/>
-              </a:rPr>
-              <a:t>Genenal</a:t>
-            </a:r>
-            <a:r>
-              <a:rPr lang="en-US" altLang="en-US" sz="1900" dirty="0" smtClean="0">
-                <a:solidFill>
-                  <a:srgbClr val="293338"/>
-                </a:solidFill>
-                <a:latin typeface="inherit"/>
-              </a:rPr>
-              <a:t> availability != Cross Platform </a:t>
-            </a:r>
+            <a:endParaRPr lang="en-US" altLang="en-US" sz="1900" dirty="0" smtClean="0">
+              <a:solidFill>
+                <a:srgbClr val="293338"/>
+              </a:solidFill>
+              <a:latin typeface="inherit"/>
+            </a:endParaRPr>
           </a:p>
           <a:p>
             <a:endParaRPr lang="en-US" altLang="en-US" sz="1900" dirty="0">

</xml_diff>